<commit_message>
added second code attempt
</commit_message>
<xml_diff>
--- a/pptxs/Milestone.pptx
+++ b/pptxs/Milestone.pptx
@@ -4107,7 +4107,7 @@
         </p:blipFill>
         <p:spPr>
           <a:xfrm>
-            <a:off x="2593793" y="699543"/>
+            <a:off x="1588875" y="870024"/>
             <a:ext cx="3403244" cy="4170429"/>
           </a:xfrm>
         </p:spPr>
@@ -4141,6 +4141,36 @@
           </a:p>
         </p:txBody>
       </p:sp>
+      <p:pic>
+        <p:nvPicPr>
+          <p:cNvPr id="4" name="Picture 3">
+            <a:extLst>
+              <a:ext uri="{FF2B5EF4-FFF2-40B4-BE49-F238E27FC236}">
+                <a16:creationId xmlns:a16="http://schemas.microsoft.com/office/drawing/2014/main" id="{453058F4-85A3-47F1-99FE-2CEF40A07BE1}"/>
+              </a:ext>
+            </a:extLst>
+          </p:cNvPr>
+          <p:cNvPicPr>
+            <a:picLocks noChangeAspect="1"/>
+          </p:cNvPicPr>
+          <p:nvPr/>
+        </p:nvPicPr>
+        <p:blipFill>
+          <a:blip r:embed="rId3"/>
+          <a:stretch>
+            <a:fillRect/>
+          </a:stretch>
+        </p:blipFill>
+        <p:spPr>
+          <a:xfrm>
+            <a:off x="5441569" y="1945449"/>
+            <a:ext cx="2183597" cy="1788597"/>
+          </a:xfrm>
+          <a:prstGeom prst="rect">
+            <a:avLst/>
+          </a:prstGeom>
+        </p:spPr>
+      </p:pic>
     </p:spTree>
     <p:extLst>
       <p:ext uri="{BB962C8B-B14F-4D97-AF65-F5344CB8AC3E}">

</xml_diff>